<commit_message>
Updated notebook for Iris Decision Tree Model in R
</commit_message>
<xml_diff>
--- a/supplemental_topics/R_Iris_Examples.pptx
+++ b/supplemental_topics/R_Iris_Examples.pptx
@@ -5,13 +5,25 @@
     <p:sldMasterId id="2147483648" r:id="rId1"/>
   </p:sldMasterIdLst>
   <p:notesMasterIdLst>
-    <p:notesMasterId r:id="rId6"/>
+    <p:notesMasterId r:id="rId18"/>
   </p:notesMasterIdLst>
   <p:sldIdLst>
     <p:sldId id="257" r:id="rId2"/>
     <p:sldId id="258" r:id="rId3"/>
     <p:sldId id="259" r:id="rId4"/>
     <p:sldId id="260" r:id="rId5"/>
+    <p:sldId id="261" r:id="rId6"/>
+    <p:sldId id="262" r:id="rId7"/>
+    <p:sldId id="263" r:id="rId8"/>
+    <p:sldId id="264" r:id="rId9"/>
+    <p:sldId id="265" r:id="rId10"/>
+    <p:sldId id="266" r:id="rId11"/>
+    <p:sldId id="268" r:id="rId12"/>
+    <p:sldId id="267" r:id="rId13"/>
+    <p:sldId id="269" r:id="rId14"/>
+    <p:sldId id="270" r:id="rId15"/>
+    <p:sldId id="271" r:id="rId16"/>
+    <p:sldId id="272" r:id="rId17"/>
   </p:sldIdLst>
   <p:sldSz cx="12192000" cy="6858000"/>
   <p:notesSz cx="6858000" cy="9144000"/>
@@ -3937,6 +3949,1093 @@
 </p:sld>
 </file>
 
+<file path=ppt/slides/slide10.xml><?xml version="1.0" encoding="utf-8"?>
+<p:sld xmlns:a="http://schemas.openxmlformats.org/drawingml/2006/main" xmlns:r="http://schemas.openxmlformats.org/officeDocument/2006/relationships" xmlns:p="http://schemas.openxmlformats.org/presentationml/2006/main">
+  <p:cSld>
+    <p:spTree>
+      <p:nvGrpSpPr>
+        <p:cNvPr id="1" name=""/>
+        <p:cNvGrpSpPr/>
+        <p:nvPr/>
+      </p:nvGrpSpPr>
+      <p:grpSpPr>
+        <a:xfrm>
+          <a:off x="0" y="0"/>
+          <a:ext cx="0" cy="0"/>
+          <a:chOff x="0" y="0"/>
+          <a:chExt cx="0" cy="0"/>
+        </a:xfrm>
+      </p:grpSpPr>
+      <p:sp>
+        <p:nvSpPr>
+          <p:cNvPr id="2" name="Title 1">
+            <a:extLst>
+              <a:ext uri="{FF2B5EF4-FFF2-40B4-BE49-F238E27FC236}">
+                <a16:creationId xmlns:a16="http://schemas.microsoft.com/office/drawing/2014/main" id="{62A8711A-0021-2458-F022-1D0E20C6173D}"/>
+              </a:ext>
+            </a:extLst>
+          </p:cNvPr>
+          <p:cNvSpPr>
+            <a:spLocks noGrp="1"/>
+          </p:cNvSpPr>
+          <p:nvPr>
+            <p:ph type="title"/>
+          </p:nvPr>
+        </p:nvSpPr>
+        <p:spPr/>
+        <p:txBody>
+          <a:bodyPr/>
+          <a:lstStyle/>
+          <a:p>
+            <a:r>
+              <a:rPr lang="en-US" dirty="0"/>
+              <a:t>Train-Test Split</a:t>
+            </a:r>
+          </a:p>
+        </p:txBody>
+      </p:sp>
+      <p:sp>
+        <p:nvSpPr>
+          <p:cNvPr id="3" name="Content Placeholder 2">
+            <a:extLst>
+              <a:ext uri="{FF2B5EF4-FFF2-40B4-BE49-F238E27FC236}">
+                <a16:creationId xmlns:a16="http://schemas.microsoft.com/office/drawing/2014/main" id="{23463EF7-DE95-8137-CD49-4A88B5B61726}"/>
+              </a:ext>
+            </a:extLst>
+          </p:cNvPr>
+          <p:cNvSpPr>
+            <a:spLocks noGrp="1"/>
+          </p:cNvSpPr>
+          <p:nvPr>
+            <p:ph idx="1"/>
+          </p:nvPr>
+        </p:nvSpPr>
+        <p:spPr/>
+        <p:txBody>
+          <a:bodyPr/>
+          <a:lstStyle/>
+          <a:p>
+            <a:r>
+              <a:rPr lang="en-US" dirty="0"/>
+              <a:t>For machine learning models, it is important to do a train-test split</a:t>
+            </a:r>
+          </a:p>
+          <a:p>
+            <a:r>
+              <a:rPr lang="en-US" dirty="0"/>
+              <a:t>The training data is used to train the model</a:t>
+            </a:r>
+          </a:p>
+          <a:p>
+            <a:r>
+              <a:rPr lang="en-US" dirty="0"/>
+              <a:t>The test data is used to validate the model on unseen data (that is, data not used in </a:t>
+            </a:r>
+            <a:r>
+              <a:rPr lang="en-US" dirty="0" err="1"/>
+              <a:t>trainig</a:t>
+            </a:r>
+            <a:r>
+              <a:rPr lang="en-US" dirty="0"/>
+              <a:t>)</a:t>
+            </a:r>
+          </a:p>
+          <a:p>
+            <a:r>
+              <a:rPr lang="en-US" dirty="0"/>
+              <a:t>It can be important to stratify the data so that each group of the target is equally represented</a:t>
+            </a:r>
+          </a:p>
+        </p:txBody>
+      </p:sp>
+      <p:sp>
+        <p:nvSpPr>
+          <p:cNvPr id="4" name="Text Placeholder 3">
+            <a:extLst>
+              <a:ext uri="{FF2B5EF4-FFF2-40B4-BE49-F238E27FC236}">
+                <a16:creationId xmlns:a16="http://schemas.microsoft.com/office/drawing/2014/main" id="{0FC1B90E-8542-0C45-010B-F8F8E7D67328}"/>
+              </a:ext>
+            </a:extLst>
+          </p:cNvPr>
+          <p:cNvSpPr>
+            <a:spLocks noGrp="1"/>
+          </p:cNvSpPr>
+          <p:nvPr>
+            <p:ph type="body" sz="half" idx="2"/>
+          </p:nvPr>
+        </p:nvSpPr>
+        <p:spPr/>
+        <p:txBody>
+          <a:bodyPr>
+            <a:normAutofit/>
+          </a:bodyPr>
+          <a:lstStyle/>
+          <a:p>
+            <a:r>
+              <a:rPr lang="en-US" sz="2800" dirty="0" err="1"/>
+              <a:t>set.seed</a:t>
+            </a:r>
+            <a:r>
+              <a:rPr lang="en-US" sz="2800" dirty="0"/>
+              <a:t>(1)</a:t>
+            </a:r>
+          </a:p>
+          <a:p>
+            <a:r>
+              <a:rPr lang="en-US" sz="2800" dirty="0" err="1"/>
+              <a:t>train.index</a:t>
+            </a:r>
+            <a:r>
+              <a:rPr lang="en-US" sz="2800" dirty="0"/>
+              <a:t> = </a:t>
+            </a:r>
+            <a:r>
+              <a:rPr lang="en-US" sz="2800" dirty="0" err="1"/>
+              <a:t>createDataPartition</a:t>
+            </a:r>
+            <a:r>
+              <a:rPr lang="en-US" sz="2800" dirty="0"/>
+              <a:t>(</a:t>
+            </a:r>
+            <a:r>
+              <a:rPr lang="en-US" sz="2800" dirty="0" err="1"/>
+              <a:t>iris$Species</a:t>
+            </a:r>
+            <a:r>
+              <a:rPr lang="en-US" sz="2800" dirty="0"/>
+              <a:t>, p=.7, list=FALSE)</a:t>
+            </a:r>
+          </a:p>
+          <a:p>
+            <a:r>
+              <a:rPr lang="en-US" sz="2800" dirty="0"/>
+              <a:t>train &lt;- iris[</a:t>
+            </a:r>
+            <a:r>
+              <a:rPr lang="en-US" sz="2800" dirty="0" err="1"/>
+              <a:t>train.index</a:t>
+            </a:r>
+            <a:r>
+              <a:rPr lang="en-US" sz="2800" dirty="0"/>
+              <a:t>, ]            </a:t>
+            </a:r>
+          </a:p>
+          <a:p>
+            <a:r>
+              <a:rPr lang="en-US" sz="2800" dirty="0"/>
+              <a:t>test &lt;- iris[-</a:t>
+            </a:r>
+            <a:r>
+              <a:rPr lang="en-US" sz="2800" dirty="0" err="1"/>
+              <a:t>train.index</a:t>
+            </a:r>
+            <a:r>
+              <a:rPr lang="en-US" sz="2800" dirty="0"/>
+              <a:t>, ]</a:t>
+            </a:r>
+          </a:p>
+        </p:txBody>
+      </p:sp>
+    </p:spTree>
+    <p:extLst>
+      <p:ext uri="{BB962C8B-B14F-4D97-AF65-F5344CB8AC3E}">
+        <p14:creationId xmlns:p14="http://schemas.microsoft.com/office/powerpoint/2010/main" val="3844766992"/>
+      </p:ext>
+    </p:extLst>
+  </p:cSld>
+  <p:clrMapOvr>
+    <a:masterClrMapping/>
+  </p:clrMapOvr>
+</p:sld>
+</file>
+
+<file path=ppt/slides/slide11.xml><?xml version="1.0" encoding="utf-8"?>
+<p:sld xmlns:a="http://schemas.openxmlformats.org/drawingml/2006/main" xmlns:r="http://schemas.openxmlformats.org/officeDocument/2006/relationships" xmlns:p="http://schemas.openxmlformats.org/presentationml/2006/main">
+  <p:cSld>
+    <p:spTree>
+      <p:nvGrpSpPr>
+        <p:cNvPr id="1" name=""/>
+        <p:cNvGrpSpPr/>
+        <p:nvPr/>
+      </p:nvGrpSpPr>
+      <p:grpSpPr>
+        <a:xfrm>
+          <a:off x="0" y="0"/>
+          <a:ext cx="0" cy="0"/>
+          <a:chOff x="0" y="0"/>
+          <a:chExt cx="0" cy="0"/>
+        </a:xfrm>
+      </p:grpSpPr>
+      <p:sp>
+        <p:nvSpPr>
+          <p:cNvPr id="2" name="Title 1">
+            <a:extLst>
+              <a:ext uri="{FF2B5EF4-FFF2-40B4-BE49-F238E27FC236}">
+                <a16:creationId xmlns:a16="http://schemas.microsoft.com/office/drawing/2014/main" id="{197DB697-5777-DB75-BC22-78A966C83C53}"/>
+              </a:ext>
+            </a:extLst>
+          </p:cNvPr>
+          <p:cNvSpPr>
+            <a:spLocks noGrp="1"/>
+          </p:cNvSpPr>
+          <p:nvPr>
+            <p:ph type="title"/>
+          </p:nvPr>
+        </p:nvSpPr>
+        <p:spPr/>
+        <p:txBody>
+          <a:bodyPr/>
+          <a:lstStyle/>
+          <a:p>
+            <a:r>
+              <a:rPr lang="en-US" dirty="0"/>
+              <a:t>Training the model</a:t>
+            </a:r>
+          </a:p>
+        </p:txBody>
+      </p:sp>
+      <p:sp>
+        <p:nvSpPr>
+          <p:cNvPr id="3" name="Content Placeholder 2">
+            <a:extLst>
+              <a:ext uri="{FF2B5EF4-FFF2-40B4-BE49-F238E27FC236}">
+                <a16:creationId xmlns:a16="http://schemas.microsoft.com/office/drawing/2014/main" id="{CE50F056-571A-C099-C5B5-1AFB1AB2518E}"/>
+              </a:ext>
+            </a:extLst>
+          </p:cNvPr>
+          <p:cNvSpPr>
+            <a:spLocks noGrp="1"/>
+          </p:cNvSpPr>
+          <p:nvPr>
+            <p:ph idx="1"/>
+          </p:nvPr>
+        </p:nvSpPr>
+        <p:spPr/>
+        <p:txBody>
+          <a:bodyPr/>
+          <a:lstStyle/>
+          <a:p>
+            <a:r>
+              <a:rPr lang="en-US" dirty="0"/>
+              <a:t>The model is trained on the training portion of the data</a:t>
+            </a:r>
+          </a:p>
+          <a:p>
+            <a:r>
+              <a:rPr lang="en-US" dirty="0"/>
+              <a:t>Output as shown below is generated</a:t>
+            </a:r>
+          </a:p>
+          <a:p>
+            <a:r>
+              <a:rPr lang="en-US" dirty="0"/>
+              <a:t>Next we will plot this model</a:t>
+            </a:r>
+          </a:p>
+        </p:txBody>
+      </p:sp>
+      <p:sp>
+        <p:nvSpPr>
+          <p:cNvPr id="4" name="Text Placeholder 3">
+            <a:extLst>
+              <a:ext uri="{FF2B5EF4-FFF2-40B4-BE49-F238E27FC236}">
+                <a16:creationId xmlns:a16="http://schemas.microsoft.com/office/drawing/2014/main" id="{39286971-5947-97E7-3906-736C84341848}"/>
+              </a:ext>
+            </a:extLst>
+          </p:cNvPr>
+          <p:cNvSpPr>
+            <a:spLocks noGrp="1"/>
+          </p:cNvSpPr>
+          <p:nvPr>
+            <p:ph type="body" sz="half" idx="2"/>
+          </p:nvPr>
+        </p:nvSpPr>
+        <p:spPr/>
+        <p:txBody>
+          <a:bodyPr>
+            <a:normAutofit/>
+          </a:bodyPr>
+          <a:lstStyle/>
+          <a:p>
+            <a:r>
+              <a:rPr lang="en-US" sz="2800" dirty="0"/>
+              <a:t>model &lt;- </a:t>
+            </a:r>
+            <a:r>
+              <a:rPr lang="en-US" sz="2800" dirty="0" err="1"/>
+              <a:t>rpart</a:t>
+            </a:r>
+            <a:r>
+              <a:rPr lang="en-US" sz="2800" dirty="0"/>
+              <a:t>(Species ~ ., data = train, method = "class")</a:t>
+            </a:r>
+          </a:p>
+          <a:p>
+            <a:r>
+              <a:rPr lang="en-US" sz="2800" dirty="0"/>
+              <a:t>model</a:t>
+            </a:r>
+          </a:p>
+        </p:txBody>
+      </p:sp>
+      <p:pic>
+        <p:nvPicPr>
+          <p:cNvPr id="6" name="Picture 5" descr="Graphical user interface, text, application&#10;&#10;Description automatically generated">
+            <a:extLst>
+              <a:ext uri="{FF2B5EF4-FFF2-40B4-BE49-F238E27FC236}">
+                <a16:creationId xmlns:a16="http://schemas.microsoft.com/office/drawing/2014/main" id="{72A08A6C-BA91-3ED4-5F3B-B24354271DA7}"/>
+              </a:ext>
+            </a:extLst>
+          </p:cNvPr>
+          <p:cNvPicPr>
+            <a:picLocks noChangeAspect="1"/>
+          </p:cNvPicPr>
+          <p:nvPr/>
+        </p:nvPicPr>
+        <p:blipFill>
+          <a:blip r:embed="rId2"/>
+          <a:stretch>
+            <a:fillRect/>
+          </a:stretch>
+        </p:blipFill>
+        <p:spPr>
+          <a:xfrm>
+            <a:off x="2113775" y="3802960"/>
+            <a:ext cx="7772400" cy="2597840"/>
+          </a:xfrm>
+          <a:prstGeom prst="rect">
+            <a:avLst/>
+          </a:prstGeom>
+        </p:spPr>
+      </p:pic>
+    </p:spTree>
+    <p:extLst>
+      <p:ext uri="{BB962C8B-B14F-4D97-AF65-F5344CB8AC3E}">
+        <p14:creationId xmlns:p14="http://schemas.microsoft.com/office/powerpoint/2010/main" val="1658389429"/>
+      </p:ext>
+    </p:extLst>
+  </p:cSld>
+  <p:clrMapOvr>
+    <a:masterClrMapping/>
+  </p:clrMapOvr>
+</p:sld>
+</file>
+
+<file path=ppt/slides/slide12.xml><?xml version="1.0" encoding="utf-8"?>
+<p:sld xmlns:a="http://schemas.openxmlformats.org/drawingml/2006/main" xmlns:r="http://schemas.openxmlformats.org/officeDocument/2006/relationships" xmlns:p="http://schemas.openxmlformats.org/presentationml/2006/main">
+  <p:cSld>
+    <p:spTree>
+      <p:nvGrpSpPr>
+        <p:cNvPr id="1" name=""/>
+        <p:cNvGrpSpPr/>
+        <p:nvPr/>
+      </p:nvGrpSpPr>
+      <p:grpSpPr>
+        <a:xfrm>
+          <a:off x="0" y="0"/>
+          <a:ext cx="0" cy="0"/>
+          <a:chOff x="0" y="0"/>
+          <a:chExt cx="0" cy="0"/>
+        </a:xfrm>
+      </p:grpSpPr>
+      <p:sp>
+        <p:nvSpPr>
+          <p:cNvPr id="2" name="Title 1">
+            <a:extLst>
+              <a:ext uri="{FF2B5EF4-FFF2-40B4-BE49-F238E27FC236}">
+                <a16:creationId xmlns:a16="http://schemas.microsoft.com/office/drawing/2014/main" id="{93CB8D5C-079B-12D8-EA8A-7B865F3CA070}"/>
+              </a:ext>
+            </a:extLst>
+          </p:cNvPr>
+          <p:cNvSpPr>
+            <a:spLocks noGrp="1"/>
+          </p:cNvSpPr>
+          <p:nvPr>
+            <p:ph type="title"/>
+          </p:nvPr>
+        </p:nvSpPr>
+        <p:spPr/>
+        <p:txBody>
+          <a:bodyPr/>
+          <a:lstStyle/>
+          <a:p>
+            <a:r>
+              <a:rPr lang="en-US" dirty="0"/>
+              <a:t>Examining the model</a:t>
+            </a:r>
+          </a:p>
+        </p:txBody>
+      </p:sp>
+      <p:sp>
+        <p:nvSpPr>
+          <p:cNvPr id="3" name="Content Placeholder 2">
+            <a:extLst>
+              <a:ext uri="{FF2B5EF4-FFF2-40B4-BE49-F238E27FC236}">
+                <a16:creationId xmlns:a16="http://schemas.microsoft.com/office/drawing/2014/main" id="{6F55CC45-D720-49C0-96FA-4BACB9F459C2}"/>
+              </a:ext>
+            </a:extLst>
+          </p:cNvPr>
+          <p:cNvSpPr>
+            <a:spLocks noGrp="1"/>
+          </p:cNvSpPr>
+          <p:nvPr>
+            <p:ph idx="1"/>
+          </p:nvPr>
+        </p:nvSpPr>
+        <p:spPr/>
+        <p:txBody>
+          <a:bodyPr/>
+          <a:lstStyle/>
+          <a:p>
+            <a:r>
+              <a:rPr lang="en-US" dirty="0"/>
+              <a:t>Using the </a:t>
+            </a:r>
+            <a:r>
+              <a:rPr lang="en-US" dirty="0" err="1"/>
+              <a:t>rpart</a:t>
+            </a:r>
+            <a:r>
+              <a:rPr lang="en-US" dirty="0"/>
+              <a:t> package we can plot the model</a:t>
+            </a:r>
+          </a:p>
+          <a:p>
+            <a:r>
+              <a:rPr lang="en-US" dirty="0"/>
+              <a:t>This visually shows how decisions are made</a:t>
+            </a:r>
+          </a:p>
+        </p:txBody>
+      </p:sp>
+      <p:sp>
+        <p:nvSpPr>
+          <p:cNvPr id="4" name="Text Placeholder 3">
+            <a:extLst>
+              <a:ext uri="{FF2B5EF4-FFF2-40B4-BE49-F238E27FC236}">
+                <a16:creationId xmlns:a16="http://schemas.microsoft.com/office/drawing/2014/main" id="{9E2CC1C0-F019-C33C-050B-C65B4D17C8E8}"/>
+              </a:ext>
+            </a:extLst>
+          </p:cNvPr>
+          <p:cNvSpPr>
+            <a:spLocks noGrp="1"/>
+          </p:cNvSpPr>
+          <p:nvPr>
+            <p:ph type="body" sz="half" idx="2"/>
+          </p:nvPr>
+        </p:nvSpPr>
+        <p:spPr/>
+        <p:txBody>
+          <a:bodyPr>
+            <a:normAutofit/>
+          </a:bodyPr>
+          <a:lstStyle/>
+          <a:p>
+            <a:r>
+              <a:rPr lang="en-US" sz="2800" dirty="0" err="1"/>
+              <a:t>rpart.plot</a:t>
+            </a:r>
+            <a:r>
+              <a:rPr lang="en-US" sz="2800" dirty="0"/>
+              <a:t>(model)</a:t>
+            </a:r>
+          </a:p>
+        </p:txBody>
+      </p:sp>
+      <p:pic>
+        <p:nvPicPr>
+          <p:cNvPr id="6" name="Picture 5" descr="Diagram&#10;&#10;Description automatically generated">
+            <a:extLst>
+              <a:ext uri="{FF2B5EF4-FFF2-40B4-BE49-F238E27FC236}">
+                <a16:creationId xmlns:a16="http://schemas.microsoft.com/office/drawing/2014/main" id="{F868B1B4-92C2-7274-C8A6-A46B1E88C53A}"/>
+              </a:ext>
+            </a:extLst>
+          </p:cNvPr>
+          <p:cNvPicPr>
+            <a:picLocks noChangeAspect="1"/>
+          </p:cNvPicPr>
+          <p:nvPr/>
+        </p:nvPicPr>
+        <p:blipFill>
+          <a:blip r:embed="rId2"/>
+          <a:stretch>
+            <a:fillRect/>
+          </a:stretch>
+        </p:blipFill>
+        <p:spPr>
+          <a:xfrm>
+            <a:off x="605610" y="2817810"/>
+            <a:ext cx="6176186" cy="3811589"/>
+          </a:xfrm>
+          <a:prstGeom prst="rect">
+            <a:avLst/>
+          </a:prstGeom>
+        </p:spPr>
+      </p:pic>
+    </p:spTree>
+    <p:extLst>
+      <p:ext uri="{BB962C8B-B14F-4D97-AF65-F5344CB8AC3E}">
+        <p14:creationId xmlns:p14="http://schemas.microsoft.com/office/powerpoint/2010/main" val="1927718014"/>
+      </p:ext>
+    </p:extLst>
+  </p:cSld>
+  <p:clrMapOvr>
+    <a:masterClrMapping/>
+  </p:clrMapOvr>
+</p:sld>
+</file>
+
+<file path=ppt/slides/slide13.xml><?xml version="1.0" encoding="utf-8"?>
+<p:sld xmlns:a="http://schemas.openxmlformats.org/drawingml/2006/main" xmlns:r="http://schemas.openxmlformats.org/officeDocument/2006/relationships" xmlns:p="http://schemas.openxmlformats.org/presentationml/2006/main">
+  <p:cSld>
+    <p:spTree>
+      <p:nvGrpSpPr>
+        <p:cNvPr id="1" name=""/>
+        <p:cNvGrpSpPr/>
+        <p:nvPr/>
+      </p:nvGrpSpPr>
+      <p:grpSpPr>
+        <a:xfrm>
+          <a:off x="0" y="0"/>
+          <a:ext cx="0" cy="0"/>
+          <a:chOff x="0" y="0"/>
+          <a:chExt cx="0" cy="0"/>
+        </a:xfrm>
+      </p:grpSpPr>
+      <p:sp>
+        <p:nvSpPr>
+          <p:cNvPr id="2" name="Title 1">
+            <a:extLst>
+              <a:ext uri="{FF2B5EF4-FFF2-40B4-BE49-F238E27FC236}">
+                <a16:creationId xmlns:a16="http://schemas.microsoft.com/office/drawing/2014/main" id="{BFD7C073-A76E-C0E5-9AAF-AE7605A8896E}"/>
+              </a:ext>
+            </a:extLst>
+          </p:cNvPr>
+          <p:cNvSpPr>
+            <a:spLocks noGrp="1"/>
+          </p:cNvSpPr>
+          <p:nvPr>
+            <p:ph type="title"/>
+          </p:nvPr>
+        </p:nvSpPr>
+        <p:spPr/>
+        <p:txBody>
+          <a:bodyPr>
+            <a:normAutofit fontScale="90000"/>
+          </a:bodyPr>
+          <a:lstStyle/>
+          <a:p>
+            <a:r>
+              <a:rPr lang="en-US" dirty="0"/>
+              <a:t>Predicting with the model</a:t>
+            </a:r>
+            <a:br>
+              <a:rPr lang="en-US" dirty="0"/>
+            </a:br>
+            <a:br>
+              <a:rPr lang="en-US" dirty="0"/>
+            </a:br>
+            <a:r>
+              <a:rPr lang="en-US" dirty="0"/>
+              <a:t>Note, we predict on the </a:t>
+            </a:r>
+            <a:r>
+              <a:rPr lang="en-US" b="1" dirty="0"/>
+              <a:t>test </a:t>
+            </a:r>
+            <a:r>
+              <a:rPr lang="en-US" dirty="0"/>
+              <a:t>dataset</a:t>
+            </a:r>
+          </a:p>
+        </p:txBody>
+      </p:sp>
+      <p:sp>
+        <p:nvSpPr>
+          <p:cNvPr id="3" name="Text Placeholder 2">
+            <a:extLst>
+              <a:ext uri="{FF2B5EF4-FFF2-40B4-BE49-F238E27FC236}">
+                <a16:creationId xmlns:a16="http://schemas.microsoft.com/office/drawing/2014/main" id="{33B6FD9D-13F7-AFE7-9545-19D006C1B479}"/>
+              </a:ext>
+            </a:extLst>
+          </p:cNvPr>
+          <p:cNvSpPr>
+            <a:spLocks noGrp="1"/>
+          </p:cNvSpPr>
+          <p:nvPr>
+            <p:ph type="body" idx="1"/>
+          </p:nvPr>
+        </p:nvSpPr>
+        <p:spPr/>
+        <p:txBody>
+          <a:bodyPr/>
+          <a:lstStyle/>
+          <a:p>
+            <a:r>
+              <a:rPr lang="en-US" dirty="0"/>
+              <a:t>preds &lt;- predict(model, </a:t>
+            </a:r>
+            <a:r>
+              <a:rPr lang="en-US" dirty="0" err="1"/>
+              <a:t>newdata</a:t>
+            </a:r>
+            <a:r>
+              <a:rPr lang="en-US" dirty="0"/>
+              <a:t> = test, type = "class")</a:t>
+            </a:r>
+          </a:p>
+          <a:p>
+            <a:r>
+              <a:rPr lang="en-US" dirty="0"/>
+              <a:t>preds</a:t>
+            </a:r>
+          </a:p>
+        </p:txBody>
+      </p:sp>
+    </p:spTree>
+    <p:extLst>
+      <p:ext uri="{BB962C8B-B14F-4D97-AF65-F5344CB8AC3E}">
+        <p14:creationId xmlns:p14="http://schemas.microsoft.com/office/powerpoint/2010/main" val="44468343"/>
+      </p:ext>
+    </p:extLst>
+  </p:cSld>
+  <p:clrMapOvr>
+    <a:masterClrMapping/>
+  </p:clrMapOvr>
+</p:sld>
+</file>
+
+<file path=ppt/slides/slide14.xml><?xml version="1.0" encoding="utf-8"?>
+<p:sld xmlns:a="http://schemas.openxmlformats.org/drawingml/2006/main" xmlns:r="http://schemas.openxmlformats.org/officeDocument/2006/relationships" xmlns:p="http://schemas.openxmlformats.org/presentationml/2006/main">
+  <p:cSld>
+    <p:spTree>
+      <p:nvGrpSpPr>
+        <p:cNvPr id="1" name=""/>
+        <p:cNvGrpSpPr/>
+        <p:nvPr/>
+      </p:nvGrpSpPr>
+      <p:grpSpPr>
+        <a:xfrm>
+          <a:off x="0" y="0"/>
+          <a:ext cx="0" cy="0"/>
+          <a:chOff x="0" y="0"/>
+          <a:chExt cx="0" cy="0"/>
+        </a:xfrm>
+      </p:grpSpPr>
+      <p:sp>
+        <p:nvSpPr>
+          <p:cNvPr id="2" name="Title 1">
+            <a:extLst>
+              <a:ext uri="{FF2B5EF4-FFF2-40B4-BE49-F238E27FC236}">
+                <a16:creationId xmlns:a16="http://schemas.microsoft.com/office/drawing/2014/main" id="{34491024-F11F-E41D-7C89-091365E8BE00}"/>
+              </a:ext>
+            </a:extLst>
+          </p:cNvPr>
+          <p:cNvSpPr>
+            <a:spLocks noGrp="1"/>
+          </p:cNvSpPr>
+          <p:nvPr>
+            <p:ph type="title"/>
+          </p:nvPr>
+        </p:nvSpPr>
+        <p:spPr/>
+        <p:txBody>
+          <a:bodyPr/>
+          <a:lstStyle/>
+          <a:p>
+            <a:r>
+              <a:rPr lang="en-US" dirty="0"/>
+              <a:t>Confusion Matrix to Evaluate Results</a:t>
+            </a:r>
+          </a:p>
+        </p:txBody>
+      </p:sp>
+      <p:pic>
+        <p:nvPicPr>
+          <p:cNvPr id="6" name="Content Placeholder 5" descr="Text&#10;&#10;Description automatically generated with low confidence">
+            <a:extLst>
+              <a:ext uri="{FF2B5EF4-FFF2-40B4-BE49-F238E27FC236}">
+                <a16:creationId xmlns:a16="http://schemas.microsoft.com/office/drawing/2014/main" id="{5D7570B2-9854-2A29-EA23-5293253D6EBB}"/>
+              </a:ext>
+            </a:extLst>
+          </p:cNvPr>
+          <p:cNvPicPr>
+            <a:picLocks noGrp="1" noChangeAspect="1"/>
+          </p:cNvPicPr>
+          <p:nvPr>
+            <p:ph idx="1"/>
+          </p:nvPr>
+        </p:nvPicPr>
+        <p:blipFill>
+          <a:blip r:embed="rId2"/>
+          <a:stretch>
+            <a:fillRect/>
+          </a:stretch>
+        </p:blipFill>
+        <p:spPr>
+          <a:xfrm>
+            <a:off x="5319131" y="620888"/>
+            <a:ext cx="6023397" cy="6014088"/>
+          </a:xfrm>
+        </p:spPr>
+      </p:pic>
+      <p:sp>
+        <p:nvSpPr>
+          <p:cNvPr id="4" name="Text Placeholder 3">
+            <a:extLst>
+              <a:ext uri="{FF2B5EF4-FFF2-40B4-BE49-F238E27FC236}">
+                <a16:creationId xmlns:a16="http://schemas.microsoft.com/office/drawing/2014/main" id="{EA398441-FA0A-26F7-C043-696E1040E4CB}"/>
+              </a:ext>
+            </a:extLst>
+          </p:cNvPr>
+          <p:cNvSpPr>
+            <a:spLocks noGrp="1"/>
+          </p:cNvSpPr>
+          <p:nvPr>
+            <p:ph type="body" sz="half" idx="2"/>
+          </p:nvPr>
+        </p:nvSpPr>
+        <p:spPr/>
+        <p:txBody>
+          <a:bodyPr/>
+          <a:lstStyle/>
+          <a:p>
+            <a:r>
+              <a:rPr lang="en-US" sz="2800" dirty="0" err="1"/>
+              <a:t>confusionMatrix</a:t>
+            </a:r>
+            <a:r>
+              <a:rPr lang="en-US" sz="2800" dirty="0"/>
+              <a:t>(</a:t>
+            </a:r>
+            <a:r>
+              <a:rPr lang="en-US" sz="2800" dirty="0" err="1"/>
+              <a:t>test$Species</a:t>
+            </a:r>
+            <a:r>
+              <a:rPr lang="en-US" sz="2800" dirty="0"/>
+              <a:t>, preds)</a:t>
+            </a:r>
+          </a:p>
+          <a:p>
+            <a:endParaRPr lang="en-US" dirty="0"/>
+          </a:p>
+          <a:p>
+            <a:r>
+              <a:rPr lang="en-US" dirty="0"/>
+              <a:t>Note that results include accuracy of the model as well as other metrics for each class in the model.</a:t>
+            </a:r>
+          </a:p>
+          <a:p>
+            <a:endParaRPr lang="en-US" dirty="0"/>
+          </a:p>
+          <a:p>
+            <a:r>
+              <a:rPr lang="en-US" dirty="0"/>
+              <a:t>Next we will plot the confusion matrix shown at the top of this results output.</a:t>
+            </a:r>
+          </a:p>
+        </p:txBody>
+      </p:sp>
+    </p:spTree>
+    <p:extLst>
+      <p:ext uri="{BB962C8B-B14F-4D97-AF65-F5344CB8AC3E}">
+        <p14:creationId xmlns:p14="http://schemas.microsoft.com/office/powerpoint/2010/main" val="1339174204"/>
+      </p:ext>
+    </p:extLst>
+  </p:cSld>
+  <p:clrMapOvr>
+    <a:masterClrMapping/>
+  </p:clrMapOvr>
+</p:sld>
+</file>
+
+<file path=ppt/slides/slide15.xml><?xml version="1.0" encoding="utf-8"?>
+<p:sld xmlns:a="http://schemas.openxmlformats.org/drawingml/2006/main" xmlns:r="http://schemas.openxmlformats.org/officeDocument/2006/relationships" xmlns:p="http://schemas.openxmlformats.org/presentationml/2006/main">
+  <p:cSld>
+    <p:spTree>
+      <p:nvGrpSpPr>
+        <p:cNvPr id="1" name=""/>
+        <p:cNvGrpSpPr/>
+        <p:nvPr/>
+      </p:nvGrpSpPr>
+      <p:grpSpPr>
+        <a:xfrm>
+          <a:off x="0" y="0"/>
+          <a:ext cx="0" cy="0"/>
+          <a:chOff x="0" y="0"/>
+          <a:chExt cx="0" cy="0"/>
+        </a:xfrm>
+      </p:grpSpPr>
+      <p:sp>
+        <p:nvSpPr>
+          <p:cNvPr id="2" name="Title 1">
+            <a:extLst>
+              <a:ext uri="{FF2B5EF4-FFF2-40B4-BE49-F238E27FC236}">
+                <a16:creationId xmlns:a16="http://schemas.microsoft.com/office/drawing/2014/main" id="{98B12765-7B9F-E214-82A1-A5A80D4E7AB2}"/>
+              </a:ext>
+            </a:extLst>
+          </p:cNvPr>
+          <p:cNvSpPr>
+            <a:spLocks noGrp="1"/>
+          </p:cNvSpPr>
+          <p:nvPr>
+            <p:ph type="title"/>
+          </p:nvPr>
+        </p:nvSpPr>
+        <p:spPr/>
+        <p:txBody>
+          <a:bodyPr/>
+          <a:lstStyle/>
+          <a:p>
+            <a:r>
+              <a:rPr lang="en-US" dirty="0"/>
+              <a:t>Plotting Confusion Matrix</a:t>
+            </a:r>
+          </a:p>
+        </p:txBody>
+      </p:sp>
+      <p:pic>
+        <p:nvPicPr>
+          <p:cNvPr id="6" name="Content Placeholder 5" descr="Chart&#10;&#10;Description automatically generated">
+            <a:extLst>
+              <a:ext uri="{FF2B5EF4-FFF2-40B4-BE49-F238E27FC236}">
+                <a16:creationId xmlns:a16="http://schemas.microsoft.com/office/drawing/2014/main" id="{10B54C0D-A5C8-7B40-997E-0EB1A0A5C73E}"/>
+              </a:ext>
+            </a:extLst>
+          </p:cNvPr>
+          <p:cNvPicPr>
+            <a:picLocks noGrp="1" noChangeAspect="1"/>
+          </p:cNvPicPr>
+          <p:nvPr>
+            <p:ph idx="1"/>
+          </p:nvPr>
+        </p:nvPicPr>
+        <p:blipFill>
+          <a:blip r:embed="rId2"/>
+          <a:stretch>
+            <a:fillRect/>
+          </a:stretch>
+        </p:blipFill>
+        <p:spPr>
+          <a:xfrm>
+            <a:off x="4623792" y="1137424"/>
+            <a:ext cx="6809654" cy="4202529"/>
+          </a:xfrm>
+        </p:spPr>
+      </p:pic>
+      <p:sp>
+        <p:nvSpPr>
+          <p:cNvPr id="4" name="Text Placeholder 3">
+            <a:extLst>
+              <a:ext uri="{FF2B5EF4-FFF2-40B4-BE49-F238E27FC236}">
+                <a16:creationId xmlns:a16="http://schemas.microsoft.com/office/drawing/2014/main" id="{C8AD1DC3-7541-7CBB-005D-D304617D475F}"/>
+              </a:ext>
+            </a:extLst>
+          </p:cNvPr>
+          <p:cNvSpPr>
+            <a:spLocks noGrp="1"/>
+          </p:cNvSpPr>
+          <p:nvPr>
+            <p:ph type="body" sz="half" idx="2"/>
+          </p:nvPr>
+        </p:nvSpPr>
+        <p:spPr/>
+        <p:txBody>
+          <a:bodyPr>
+            <a:normAutofit/>
+          </a:bodyPr>
+          <a:lstStyle/>
+          <a:p>
+            <a:r>
+              <a:rPr lang="en-US" sz="2800" dirty="0"/>
+              <a:t>cm &lt;- </a:t>
+            </a:r>
+            <a:r>
+              <a:rPr lang="en-US" sz="2800" dirty="0" err="1"/>
+              <a:t>conf_mat</a:t>
+            </a:r>
+            <a:r>
+              <a:rPr lang="en-US" sz="2800" dirty="0"/>
+              <a:t>(test, Species, preds)</a:t>
+            </a:r>
+          </a:p>
+          <a:p>
+            <a:endParaRPr lang="en-US" sz="2800" dirty="0"/>
+          </a:p>
+          <a:p>
+            <a:r>
+              <a:rPr lang="en-US" sz="2800" dirty="0" err="1"/>
+              <a:t>autoplot</a:t>
+            </a:r>
+            <a:r>
+              <a:rPr lang="en-US" sz="2800" dirty="0"/>
+              <a:t>(cm, type = "heatmap") +</a:t>
+            </a:r>
+          </a:p>
+          <a:p>
+            <a:r>
+              <a:rPr lang="en-US" sz="2800" dirty="0"/>
+              <a:t>  </a:t>
+            </a:r>
+            <a:r>
+              <a:rPr lang="en-US" sz="2800" dirty="0" err="1"/>
+              <a:t>scale_fill_gradient</a:t>
+            </a:r>
+            <a:r>
+              <a:rPr lang="en-US" sz="2800" dirty="0"/>
+              <a:t>(low = "</a:t>
+            </a:r>
+            <a:r>
+              <a:rPr lang="en-US" sz="2800" dirty="0" err="1"/>
+              <a:t>steelblue</a:t>
+            </a:r>
+            <a:r>
+              <a:rPr lang="en-US" sz="2800" dirty="0"/>
+              <a:t>", high = "</a:t>
+            </a:r>
+            <a:r>
+              <a:rPr lang="en-US" sz="2800" dirty="0" err="1"/>
+              <a:t>darkred</a:t>
+            </a:r>
+            <a:r>
+              <a:rPr lang="en-US" sz="2800" dirty="0"/>
+              <a:t>")</a:t>
+            </a:r>
+          </a:p>
+        </p:txBody>
+      </p:sp>
+    </p:spTree>
+    <p:extLst>
+      <p:ext uri="{BB962C8B-B14F-4D97-AF65-F5344CB8AC3E}">
+        <p14:creationId xmlns:p14="http://schemas.microsoft.com/office/powerpoint/2010/main" val="26976442"/>
+      </p:ext>
+    </p:extLst>
+  </p:cSld>
+  <p:clrMapOvr>
+    <a:masterClrMapping/>
+  </p:clrMapOvr>
+</p:sld>
+</file>
+
+<file path=ppt/slides/slide16.xml><?xml version="1.0" encoding="utf-8"?>
+<p:sld xmlns:a="http://schemas.openxmlformats.org/drawingml/2006/main" xmlns:r="http://schemas.openxmlformats.org/officeDocument/2006/relationships" xmlns:p="http://schemas.openxmlformats.org/presentationml/2006/main">
+  <p:cSld>
+    <p:spTree>
+      <p:nvGrpSpPr>
+        <p:cNvPr id="1" name=""/>
+        <p:cNvGrpSpPr/>
+        <p:nvPr/>
+      </p:nvGrpSpPr>
+      <p:grpSpPr>
+        <a:xfrm>
+          <a:off x="0" y="0"/>
+          <a:ext cx="0" cy="0"/>
+          <a:chOff x="0" y="0"/>
+          <a:chExt cx="0" cy="0"/>
+        </a:xfrm>
+      </p:grpSpPr>
+      <p:sp>
+        <p:nvSpPr>
+          <p:cNvPr id="5" name="Title 4">
+            <a:extLst>
+              <a:ext uri="{FF2B5EF4-FFF2-40B4-BE49-F238E27FC236}">
+                <a16:creationId xmlns:a16="http://schemas.microsoft.com/office/drawing/2014/main" id="{95B997D7-A33B-8ABE-1E2D-6B27863E27F3}"/>
+              </a:ext>
+            </a:extLst>
+          </p:cNvPr>
+          <p:cNvSpPr>
+            <a:spLocks noGrp="1"/>
+          </p:cNvSpPr>
+          <p:nvPr>
+            <p:ph type="title"/>
+          </p:nvPr>
+        </p:nvSpPr>
+        <p:spPr/>
+        <p:txBody>
+          <a:bodyPr/>
+          <a:lstStyle/>
+          <a:p>
+            <a:r>
+              <a:rPr lang="en-US" dirty="0"/>
+              <a:t>Model Overview and Results</a:t>
+            </a:r>
+          </a:p>
+        </p:txBody>
+      </p:sp>
+      <p:sp>
+        <p:nvSpPr>
+          <p:cNvPr id="6" name="Content Placeholder 5">
+            <a:extLst>
+              <a:ext uri="{FF2B5EF4-FFF2-40B4-BE49-F238E27FC236}">
+                <a16:creationId xmlns:a16="http://schemas.microsoft.com/office/drawing/2014/main" id="{E6265BA3-A74A-4F0D-368C-C8ABFA7C9DA8}"/>
+              </a:ext>
+            </a:extLst>
+          </p:cNvPr>
+          <p:cNvSpPr>
+            <a:spLocks noGrp="1"/>
+          </p:cNvSpPr>
+          <p:nvPr>
+            <p:ph idx="1"/>
+          </p:nvPr>
+        </p:nvSpPr>
+        <p:spPr/>
+        <p:txBody>
+          <a:bodyPr/>
+          <a:lstStyle/>
+          <a:p>
+            <a:r>
+              <a:rPr lang="en-US" dirty="0"/>
+              <a:t>We took 150 samples of 3 iris species and created a decision tree model to help classify them</a:t>
+            </a:r>
+          </a:p>
+          <a:p>
+            <a:r>
+              <a:rPr lang="en-US" dirty="0"/>
+              <a:t>Our model had good accuracy, 93%, which might have been expected given our plots of the features</a:t>
+            </a:r>
+          </a:p>
+          <a:p>
+            <a:r>
+              <a:rPr lang="en-US" dirty="0"/>
+              <a:t>From our results, we can </a:t>
+            </a:r>
+            <a:r>
+              <a:rPr lang="en-US" dirty="0" err="1"/>
+              <a:t>Setosa</a:t>
+            </a:r>
+            <a:r>
+              <a:rPr lang="en-US" dirty="0"/>
+              <a:t> was the most easily classified with no mistakes</a:t>
+            </a:r>
+          </a:p>
+          <a:p>
+            <a:r>
+              <a:rPr lang="en-US" dirty="0"/>
+              <a:t>There was some confusion when classifying Versicolor vs Virginica</a:t>
+            </a:r>
+          </a:p>
+          <a:p>
+            <a:r>
+              <a:rPr lang="en-US" dirty="0"/>
+              <a:t>This notebook shows the process for conducting a machine learning project in R</a:t>
+            </a:r>
+          </a:p>
+        </p:txBody>
+      </p:sp>
+    </p:spTree>
+    <p:extLst>
+      <p:ext uri="{BB962C8B-B14F-4D97-AF65-F5344CB8AC3E}">
+        <p14:creationId xmlns:p14="http://schemas.microsoft.com/office/powerpoint/2010/main" val="327289163"/>
+      </p:ext>
+    </p:extLst>
+  </p:cSld>
+  <p:clrMapOvr>
+    <a:masterClrMapping/>
+  </p:clrMapOvr>
+</p:sld>
+</file>
+
 <file path=ppt/slides/slide2.xml><?xml version="1.0" encoding="utf-8"?>
 <p:sld xmlns:a="http://schemas.openxmlformats.org/drawingml/2006/main" xmlns:r="http://schemas.openxmlformats.org/officeDocument/2006/relationships" xmlns:p="http://schemas.openxmlformats.org/presentationml/2006/main">
   <p:cSld>
@@ -4363,6 +5462,13 @@
           <a:lstStyle/>
           <a:p>
             <a:r>
+              <a:rPr lang="en-US" sz="3200" dirty="0"/>
+              <a:t>Plot the count of each target species:</a:t>
+            </a:r>
+            <a:br>
+              <a:rPr lang="en-US" sz="3200" dirty="0"/>
+            </a:br>
+            <a:r>
               <a:rPr lang="en-US" sz="3200" dirty="0" err="1"/>
               <a:t>ggplot</a:t>
             </a:r>
@@ -4467,10 +5573,17 @@
         <p:spPr/>
         <p:txBody>
           <a:bodyPr>
-            <a:normAutofit/>
+            <a:normAutofit fontScale="90000"/>
           </a:bodyPr>
           <a:lstStyle/>
           <a:p>
+            <a:r>
+              <a:rPr lang="en-US" sz="3200" dirty="0"/>
+              <a:t>Plot the count of each target species with color:</a:t>
+            </a:r>
+            <a:br>
+              <a:rPr lang="en-US" sz="3200" dirty="0"/>
+            </a:br>
             <a:r>
               <a:rPr lang="en-US" sz="3200" dirty="0" err="1"/>
               <a:t>ggplot</a:t>
@@ -4562,6 +5675,855 @@
     <p:extLst>
       <p:ext uri="{BB962C8B-B14F-4D97-AF65-F5344CB8AC3E}">
         <p14:creationId xmlns:p14="http://schemas.microsoft.com/office/powerpoint/2010/main" val="1678755581"/>
+      </p:ext>
+    </p:extLst>
+  </p:cSld>
+  <p:clrMapOvr>
+    <a:masterClrMapping/>
+  </p:clrMapOvr>
+</p:sld>
+</file>
+
+<file path=ppt/slides/slide5.xml><?xml version="1.0" encoding="utf-8"?>
+<p:sld xmlns:a="http://schemas.openxmlformats.org/drawingml/2006/main" xmlns:r="http://schemas.openxmlformats.org/officeDocument/2006/relationships" xmlns:p="http://schemas.openxmlformats.org/presentationml/2006/main">
+  <p:cSld>
+    <p:spTree>
+      <p:nvGrpSpPr>
+        <p:cNvPr id="1" name=""/>
+        <p:cNvGrpSpPr/>
+        <p:nvPr/>
+      </p:nvGrpSpPr>
+      <p:grpSpPr>
+        <a:xfrm>
+          <a:off x="0" y="0"/>
+          <a:ext cx="0" cy="0"/>
+          <a:chOff x="0" y="0"/>
+          <a:chExt cx="0" cy="0"/>
+        </a:xfrm>
+      </p:grpSpPr>
+      <p:sp>
+        <p:nvSpPr>
+          <p:cNvPr id="4" name="Title 3">
+            <a:extLst>
+              <a:ext uri="{FF2B5EF4-FFF2-40B4-BE49-F238E27FC236}">
+                <a16:creationId xmlns:a16="http://schemas.microsoft.com/office/drawing/2014/main" id="{E79C621B-672A-37A2-4746-526FC3BD21A8}"/>
+              </a:ext>
+            </a:extLst>
+          </p:cNvPr>
+          <p:cNvSpPr>
+            <a:spLocks noGrp="1"/>
+          </p:cNvSpPr>
+          <p:nvPr>
+            <p:ph type="title"/>
+          </p:nvPr>
+        </p:nvSpPr>
+        <p:spPr/>
+        <p:txBody>
+          <a:bodyPr/>
+          <a:lstStyle/>
+          <a:p>
+            <a:r>
+              <a:rPr lang="en-US" dirty="0"/>
+              <a:t>Scatter plot of Features</a:t>
+            </a:r>
+          </a:p>
+        </p:txBody>
+      </p:sp>
+      <p:pic>
+        <p:nvPicPr>
+          <p:cNvPr id="8" name="Content Placeholder 7" descr="Chart, scatter chart&#10;&#10;Description automatically generated">
+            <a:extLst>
+              <a:ext uri="{FF2B5EF4-FFF2-40B4-BE49-F238E27FC236}">
+                <a16:creationId xmlns:a16="http://schemas.microsoft.com/office/drawing/2014/main" id="{CDE2315E-AA46-D28C-06CD-712E89C72BB8}"/>
+              </a:ext>
+            </a:extLst>
+          </p:cNvPr>
+          <p:cNvPicPr>
+            <a:picLocks noGrp="1" noChangeAspect="1"/>
+          </p:cNvPicPr>
+          <p:nvPr>
+            <p:ph idx="1"/>
+          </p:nvPr>
+        </p:nvPicPr>
+        <p:blipFill>
+          <a:blip r:embed="rId2"/>
+          <a:stretch>
+            <a:fillRect/>
+          </a:stretch>
+        </p:blipFill>
+        <p:spPr>
+          <a:xfrm>
+            <a:off x="5183188" y="1519673"/>
+            <a:ext cx="6172200" cy="3809129"/>
+          </a:xfrm>
+        </p:spPr>
+      </p:pic>
+      <p:sp>
+        <p:nvSpPr>
+          <p:cNvPr id="6" name="Text Placeholder 5">
+            <a:extLst>
+              <a:ext uri="{FF2B5EF4-FFF2-40B4-BE49-F238E27FC236}">
+                <a16:creationId xmlns:a16="http://schemas.microsoft.com/office/drawing/2014/main" id="{8D7EE922-368C-E57D-8320-366042B8489A}"/>
+              </a:ext>
+            </a:extLst>
+          </p:cNvPr>
+          <p:cNvSpPr>
+            <a:spLocks noGrp="1"/>
+          </p:cNvSpPr>
+          <p:nvPr>
+            <p:ph type="body" sz="half" idx="2"/>
+          </p:nvPr>
+        </p:nvSpPr>
+        <p:spPr/>
+        <p:txBody>
+          <a:bodyPr>
+            <a:normAutofit/>
+          </a:bodyPr>
+          <a:lstStyle/>
+          <a:p>
+            <a:r>
+              <a:rPr lang="en-US" sz="2800" dirty="0"/>
+              <a:t>point1 = </a:t>
+            </a:r>
+            <a:r>
+              <a:rPr lang="en-US" sz="2800" dirty="0" err="1"/>
+              <a:t>ggplot</a:t>
+            </a:r>
+            <a:r>
+              <a:rPr lang="en-US" sz="2800" dirty="0"/>
+              <a:t>(data=iris, </a:t>
+            </a:r>
+            <a:r>
+              <a:rPr lang="en-US" sz="2800" dirty="0" err="1"/>
+              <a:t>aes</a:t>
+            </a:r>
+            <a:r>
+              <a:rPr lang="en-US" sz="2800" dirty="0"/>
+              <a:t>(x=</a:t>
+            </a:r>
+            <a:r>
+              <a:rPr lang="en-US" sz="2800" dirty="0" err="1"/>
+              <a:t>Sepal.Length</a:t>
+            </a:r>
+            <a:r>
+              <a:rPr lang="en-US" sz="2800" dirty="0"/>
+              <a:t>, y=</a:t>
+            </a:r>
+            <a:r>
+              <a:rPr lang="en-US" sz="2800" dirty="0" err="1"/>
+              <a:t>Sepal.Width</a:t>
+            </a:r>
+            <a:r>
+              <a:rPr lang="en-US" sz="2800" dirty="0"/>
+              <a:t>, color=Species))</a:t>
+            </a:r>
+          </a:p>
+          <a:p>
+            <a:r>
+              <a:rPr lang="en-US" sz="2800" dirty="0"/>
+              <a:t>point1 + </a:t>
+            </a:r>
+            <a:r>
+              <a:rPr lang="en-US" sz="2800" dirty="0" err="1"/>
+              <a:t>geom_point</a:t>
+            </a:r>
+            <a:r>
+              <a:rPr lang="en-US" sz="2800" dirty="0"/>
+              <a:t>()</a:t>
+            </a:r>
+          </a:p>
+        </p:txBody>
+      </p:sp>
+    </p:spTree>
+    <p:extLst>
+      <p:ext uri="{BB962C8B-B14F-4D97-AF65-F5344CB8AC3E}">
+        <p14:creationId xmlns:p14="http://schemas.microsoft.com/office/powerpoint/2010/main" val="1429611112"/>
+      </p:ext>
+    </p:extLst>
+  </p:cSld>
+  <p:clrMapOvr>
+    <a:masterClrMapping/>
+  </p:clrMapOvr>
+</p:sld>
+</file>
+
+<file path=ppt/slides/slide6.xml><?xml version="1.0" encoding="utf-8"?>
+<p:sld xmlns:a="http://schemas.openxmlformats.org/drawingml/2006/main" xmlns:r="http://schemas.openxmlformats.org/officeDocument/2006/relationships" xmlns:p="http://schemas.openxmlformats.org/presentationml/2006/main">
+  <p:cSld>
+    <p:spTree>
+      <p:nvGrpSpPr>
+        <p:cNvPr id="1" name=""/>
+        <p:cNvGrpSpPr/>
+        <p:nvPr/>
+      </p:nvGrpSpPr>
+      <p:grpSpPr>
+        <a:xfrm>
+          <a:off x="0" y="0"/>
+          <a:ext cx="0" cy="0"/>
+          <a:chOff x="0" y="0"/>
+          <a:chExt cx="0" cy="0"/>
+        </a:xfrm>
+      </p:grpSpPr>
+      <p:sp>
+        <p:nvSpPr>
+          <p:cNvPr id="4" name="Title 3">
+            <a:extLst>
+              <a:ext uri="{FF2B5EF4-FFF2-40B4-BE49-F238E27FC236}">
+                <a16:creationId xmlns:a16="http://schemas.microsoft.com/office/drawing/2014/main" id="{E79C621B-672A-37A2-4746-526FC3BD21A8}"/>
+              </a:ext>
+            </a:extLst>
+          </p:cNvPr>
+          <p:cNvSpPr>
+            <a:spLocks noGrp="1"/>
+          </p:cNvSpPr>
+          <p:nvPr>
+            <p:ph type="title"/>
+          </p:nvPr>
+        </p:nvSpPr>
+        <p:spPr/>
+        <p:txBody>
+          <a:bodyPr/>
+          <a:lstStyle/>
+          <a:p>
+            <a:r>
+              <a:rPr lang="en-US" dirty="0"/>
+              <a:t>Scatter plot of Features</a:t>
+            </a:r>
+          </a:p>
+        </p:txBody>
+      </p:sp>
+      <p:sp>
+        <p:nvSpPr>
+          <p:cNvPr id="6" name="Text Placeholder 5">
+            <a:extLst>
+              <a:ext uri="{FF2B5EF4-FFF2-40B4-BE49-F238E27FC236}">
+                <a16:creationId xmlns:a16="http://schemas.microsoft.com/office/drawing/2014/main" id="{8D7EE922-368C-E57D-8320-366042B8489A}"/>
+              </a:ext>
+            </a:extLst>
+          </p:cNvPr>
+          <p:cNvSpPr>
+            <a:spLocks noGrp="1"/>
+          </p:cNvSpPr>
+          <p:nvPr>
+            <p:ph type="body" sz="half" idx="2"/>
+          </p:nvPr>
+        </p:nvSpPr>
+        <p:spPr/>
+        <p:txBody>
+          <a:bodyPr>
+            <a:normAutofit/>
+          </a:bodyPr>
+          <a:lstStyle/>
+          <a:p>
+            <a:r>
+              <a:rPr lang="en-US" sz="2800" dirty="0"/>
+              <a:t>point1 = </a:t>
+            </a:r>
+            <a:r>
+              <a:rPr lang="en-US" sz="2800" dirty="0" err="1"/>
+              <a:t>ggplot</a:t>
+            </a:r>
+            <a:r>
+              <a:rPr lang="en-US" sz="2800" dirty="0"/>
+              <a:t>(data=iris, </a:t>
+            </a:r>
+            <a:r>
+              <a:rPr lang="en-US" sz="2800" dirty="0" err="1"/>
+              <a:t>aes</a:t>
+            </a:r>
+            <a:r>
+              <a:rPr lang="en-US" sz="2800" dirty="0"/>
+              <a:t>(x=</a:t>
+            </a:r>
+            <a:r>
+              <a:rPr lang="en-US" sz="2800" dirty="0" err="1"/>
+              <a:t>Petal.Length</a:t>
+            </a:r>
+            <a:r>
+              <a:rPr lang="en-US" sz="2800" dirty="0"/>
+              <a:t>, y=</a:t>
+            </a:r>
+            <a:r>
+              <a:rPr lang="en-US" sz="2800" dirty="0" err="1"/>
+              <a:t>Petal.Width</a:t>
+            </a:r>
+            <a:r>
+              <a:rPr lang="en-US" sz="2800" dirty="0"/>
+              <a:t>, color=Species))</a:t>
+            </a:r>
+          </a:p>
+          <a:p>
+            <a:r>
+              <a:rPr lang="en-US" sz="2800" dirty="0"/>
+              <a:t>point1 + </a:t>
+            </a:r>
+            <a:r>
+              <a:rPr lang="en-US" sz="2800" dirty="0" err="1"/>
+              <a:t>geom_point</a:t>
+            </a:r>
+            <a:r>
+              <a:rPr lang="en-US" sz="2800" dirty="0"/>
+              <a:t>() </a:t>
+            </a:r>
+          </a:p>
+        </p:txBody>
+      </p:sp>
+      <p:pic>
+        <p:nvPicPr>
+          <p:cNvPr id="7" name="Content Placeholder 6" descr="Chart, scatter chart&#10;&#10;Description automatically generated">
+            <a:extLst>
+              <a:ext uri="{FF2B5EF4-FFF2-40B4-BE49-F238E27FC236}">
+                <a16:creationId xmlns:a16="http://schemas.microsoft.com/office/drawing/2014/main" id="{21782746-8235-6336-43D7-C4AE8ABAEE09}"/>
+              </a:ext>
+            </a:extLst>
+          </p:cNvPr>
+          <p:cNvPicPr>
+            <a:picLocks noGrp="1" noChangeAspect="1"/>
+          </p:cNvPicPr>
+          <p:nvPr>
+            <p:ph idx="1"/>
+          </p:nvPr>
+        </p:nvPicPr>
+        <p:blipFill>
+          <a:blip r:embed="rId2"/>
+          <a:stretch>
+            <a:fillRect/>
+          </a:stretch>
+        </p:blipFill>
+        <p:spPr>
+          <a:xfrm>
+            <a:off x="5183188" y="1519673"/>
+            <a:ext cx="6172200" cy="3809129"/>
+          </a:xfrm>
+        </p:spPr>
+      </p:pic>
+    </p:spTree>
+    <p:extLst>
+      <p:ext uri="{BB962C8B-B14F-4D97-AF65-F5344CB8AC3E}">
+        <p14:creationId xmlns:p14="http://schemas.microsoft.com/office/powerpoint/2010/main" val="1176068182"/>
+      </p:ext>
+    </p:extLst>
+  </p:cSld>
+  <p:clrMapOvr>
+    <a:masterClrMapping/>
+  </p:clrMapOvr>
+</p:sld>
+</file>
+
+<file path=ppt/slides/slide7.xml><?xml version="1.0" encoding="utf-8"?>
+<p:sld xmlns:a="http://schemas.openxmlformats.org/drawingml/2006/main" xmlns:r="http://schemas.openxmlformats.org/officeDocument/2006/relationships" xmlns:p="http://schemas.openxmlformats.org/presentationml/2006/main">
+  <p:cSld>
+    <p:spTree>
+      <p:nvGrpSpPr>
+        <p:cNvPr id="1" name=""/>
+        <p:cNvGrpSpPr/>
+        <p:nvPr/>
+      </p:nvGrpSpPr>
+      <p:grpSpPr>
+        <a:xfrm>
+          <a:off x="0" y="0"/>
+          <a:ext cx="0" cy="0"/>
+          <a:chOff x="0" y="0"/>
+          <a:chExt cx="0" cy="0"/>
+        </a:xfrm>
+      </p:grpSpPr>
+      <p:sp>
+        <p:nvSpPr>
+          <p:cNvPr id="5" name="Title 4">
+            <a:extLst>
+              <a:ext uri="{FF2B5EF4-FFF2-40B4-BE49-F238E27FC236}">
+                <a16:creationId xmlns:a16="http://schemas.microsoft.com/office/drawing/2014/main" id="{F4D8DE40-1302-6EA0-3B8A-4390F9473DDD}"/>
+              </a:ext>
+            </a:extLst>
+          </p:cNvPr>
+          <p:cNvSpPr>
+            <a:spLocks noGrp="1"/>
+          </p:cNvSpPr>
+          <p:nvPr>
+            <p:ph type="title"/>
+          </p:nvPr>
+        </p:nvSpPr>
+        <p:spPr/>
+        <p:txBody>
+          <a:bodyPr/>
+          <a:lstStyle/>
+          <a:p>
+            <a:r>
+              <a:rPr lang="en-US" dirty="0"/>
+              <a:t>Wide Form vs Long Form</a:t>
+            </a:r>
+            <a:br>
+              <a:rPr lang="en-US" dirty="0"/>
+            </a:br>
+            <a:r>
+              <a:rPr lang="en-US" sz="1600" dirty="0"/>
+              <a:t>Wide form has a column for each feature. Long form has a column indicating feature and a column indicating the value of that feature. </a:t>
+            </a:r>
+            <a:br>
+              <a:rPr lang="en-US" sz="1600" dirty="0"/>
+            </a:br>
+            <a:r>
+              <a:rPr lang="en-US" sz="1600" dirty="0"/>
+              <a:t>Some plots in R require a long form of the data. </a:t>
+            </a:r>
+            <a:endParaRPr lang="en-US" dirty="0"/>
+          </a:p>
+        </p:txBody>
+      </p:sp>
+      <p:sp>
+        <p:nvSpPr>
+          <p:cNvPr id="6" name="Text Placeholder 5">
+            <a:extLst>
+              <a:ext uri="{FF2B5EF4-FFF2-40B4-BE49-F238E27FC236}">
+                <a16:creationId xmlns:a16="http://schemas.microsoft.com/office/drawing/2014/main" id="{9A59E818-3909-22B9-3A49-89E78A62184F}"/>
+              </a:ext>
+            </a:extLst>
+          </p:cNvPr>
+          <p:cNvSpPr>
+            <a:spLocks noGrp="1"/>
+          </p:cNvSpPr>
+          <p:nvPr>
+            <p:ph type="body" idx="1"/>
+          </p:nvPr>
+        </p:nvSpPr>
+        <p:spPr/>
+        <p:txBody>
+          <a:bodyPr/>
+          <a:lstStyle/>
+          <a:p>
+            <a:endParaRPr lang="en-US" dirty="0"/>
+          </a:p>
+          <a:p>
+            <a:r>
+              <a:rPr lang="en-US" dirty="0" err="1"/>
+              <a:t>iris_melted</a:t>
+            </a:r>
+            <a:r>
+              <a:rPr lang="en-US" dirty="0"/>
+              <a:t> &lt;- melt(iris, </a:t>
+            </a:r>
+            <a:r>
+              <a:rPr lang="en-US" dirty="0" err="1"/>
+              <a:t>id.vars</a:t>
+            </a:r>
+            <a:r>
+              <a:rPr lang="en-US" dirty="0"/>
+              <a:t>="Species")</a:t>
+            </a:r>
+          </a:p>
+          <a:p>
+            <a:r>
+              <a:rPr lang="en-US" dirty="0" err="1"/>
+              <a:t>iris_melted</a:t>
+            </a:r>
+            <a:endParaRPr lang="en-US" dirty="0"/>
+          </a:p>
+        </p:txBody>
+      </p:sp>
+      <p:pic>
+        <p:nvPicPr>
+          <p:cNvPr id="8" name="Picture 7" descr="Graphical user interface, application&#10;&#10;Description automatically generated">
+            <a:extLst>
+              <a:ext uri="{FF2B5EF4-FFF2-40B4-BE49-F238E27FC236}">
+                <a16:creationId xmlns:a16="http://schemas.microsoft.com/office/drawing/2014/main" id="{25BB8430-3497-9A52-1869-D6947314550B}"/>
+              </a:ext>
+            </a:extLst>
+          </p:cNvPr>
+          <p:cNvPicPr>
+            <a:picLocks noChangeAspect="1"/>
+          </p:cNvPicPr>
+          <p:nvPr/>
+        </p:nvPicPr>
+        <p:blipFill>
+          <a:blip r:embed="rId2"/>
+          <a:stretch>
+            <a:fillRect/>
+          </a:stretch>
+        </p:blipFill>
+        <p:spPr>
+          <a:xfrm>
+            <a:off x="6977106" y="29583"/>
+            <a:ext cx="4876961" cy="2993081"/>
+          </a:xfrm>
+          <a:prstGeom prst="rect">
+            <a:avLst/>
+          </a:prstGeom>
+        </p:spPr>
+      </p:pic>
+      <p:pic>
+        <p:nvPicPr>
+          <p:cNvPr id="10" name="Picture 9" descr="Table&#10;&#10;Description automatically generated">
+            <a:extLst>
+              <a:ext uri="{FF2B5EF4-FFF2-40B4-BE49-F238E27FC236}">
+                <a16:creationId xmlns:a16="http://schemas.microsoft.com/office/drawing/2014/main" id="{24B99202-90AA-362D-804A-925B9ADB2908}"/>
+              </a:ext>
+            </a:extLst>
+          </p:cNvPr>
+          <p:cNvPicPr>
+            <a:picLocks noChangeAspect="1"/>
+          </p:cNvPicPr>
+          <p:nvPr/>
+        </p:nvPicPr>
+        <p:blipFill>
+          <a:blip r:embed="rId3"/>
+          <a:stretch>
+            <a:fillRect/>
+          </a:stretch>
+        </p:blipFill>
+        <p:spPr>
+          <a:xfrm>
+            <a:off x="131634" y="78662"/>
+            <a:ext cx="6618023" cy="2852737"/>
+          </a:xfrm>
+          <a:prstGeom prst="rect">
+            <a:avLst/>
+          </a:prstGeom>
+        </p:spPr>
+      </p:pic>
+    </p:spTree>
+    <p:extLst>
+      <p:ext uri="{BB962C8B-B14F-4D97-AF65-F5344CB8AC3E}">
+        <p14:creationId xmlns:p14="http://schemas.microsoft.com/office/powerpoint/2010/main" val="4092443332"/>
+      </p:ext>
+    </p:extLst>
+  </p:cSld>
+  <p:clrMapOvr>
+    <a:masterClrMapping/>
+  </p:clrMapOvr>
+</p:sld>
+</file>
+
+<file path=ppt/slides/slide8.xml><?xml version="1.0" encoding="utf-8"?>
+<p:sld xmlns:a="http://schemas.openxmlformats.org/drawingml/2006/main" xmlns:r="http://schemas.openxmlformats.org/officeDocument/2006/relationships" xmlns:p="http://schemas.openxmlformats.org/presentationml/2006/main">
+  <p:cSld>
+    <p:spTree>
+      <p:nvGrpSpPr>
+        <p:cNvPr id="1" name=""/>
+        <p:cNvGrpSpPr/>
+        <p:nvPr/>
+      </p:nvGrpSpPr>
+      <p:grpSpPr>
+        <a:xfrm>
+          <a:off x="0" y="0"/>
+          <a:ext cx="0" cy="0"/>
+          <a:chOff x="0" y="0"/>
+          <a:chExt cx="0" cy="0"/>
+        </a:xfrm>
+      </p:grpSpPr>
+      <p:sp>
+        <p:nvSpPr>
+          <p:cNvPr id="4" name="Title 3">
+            <a:extLst>
+              <a:ext uri="{FF2B5EF4-FFF2-40B4-BE49-F238E27FC236}">
+                <a16:creationId xmlns:a16="http://schemas.microsoft.com/office/drawing/2014/main" id="{F2ACF975-7A3C-64A8-E0FA-FB9F354B6CBE}"/>
+              </a:ext>
+            </a:extLst>
+          </p:cNvPr>
+          <p:cNvSpPr>
+            <a:spLocks noGrp="1"/>
+          </p:cNvSpPr>
+          <p:nvPr>
+            <p:ph type="title"/>
+          </p:nvPr>
+        </p:nvSpPr>
+        <p:spPr/>
+        <p:txBody>
+          <a:bodyPr/>
+          <a:lstStyle/>
+          <a:p>
+            <a:r>
+              <a:rPr lang="en-US" dirty="0"/>
+              <a:t>Bar Plot of all Features</a:t>
+            </a:r>
+          </a:p>
+        </p:txBody>
+      </p:sp>
+      <p:pic>
+        <p:nvPicPr>
+          <p:cNvPr id="13" name="Content Placeholder 12" descr="Chart, bar chart&#10;&#10;Description automatically generated">
+            <a:extLst>
+              <a:ext uri="{FF2B5EF4-FFF2-40B4-BE49-F238E27FC236}">
+                <a16:creationId xmlns:a16="http://schemas.microsoft.com/office/drawing/2014/main" id="{58FC04DC-7D27-84C5-1A0C-9FE96F6A9FB2}"/>
+              </a:ext>
+            </a:extLst>
+          </p:cNvPr>
+          <p:cNvPicPr>
+            <a:picLocks noGrp="1" noChangeAspect="1"/>
+          </p:cNvPicPr>
+          <p:nvPr>
+            <p:ph idx="1"/>
+          </p:nvPr>
+        </p:nvPicPr>
+        <p:blipFill>
+          <a:blip r:embed="rId2"/>
+          <a:stretch>
+            <a:fillRect/>
+          </a:stretch>
+        </p:blipFill>
+        <p:spPr>
+          <a:xfrm>
+            <a:off x="5183188" y="1519673"/>
+            <a:ext cx="6172200" cy="3809129"/>
+          </a:xfrm>
+        </p:spPr>
+      </p:pic>
+      <p:sp>
+        <p:nvSpPr>
+          <p:cNvPr id="6" name="Text Placeholder 5">
+            <a:extLst>
+              <a:ext uri="{FF2B5EF4-FFF2-40B4-BE49-F238E27FC236}">
+                <a16:creationId xmlns:a16="http://schemas.microsoft.com/office/drawing/2014/main" id="{DC692EF3-137D-6383-99DA-B1E6C863B09F}"/>
+              </a:ext>
+            </a:extLst>
+          </p:cNvPr>
+          <p:cNvSpPr>
+            <a:spLocks noGrp="1"/>
+          </p:cNvSpPr>
+          <p:nvPr>
+            <p:ph type="body" sz="half" idx="2"/>
+          </p:nvPr>
+        </p:nvSpPr>
+        <p:spPr/>
+        <p:txBody>
+          <a:bodyPr>
+            <a:normAutofit/>
+          </a:bodyPr>
+          <a:lstStyle/>
+          <a:p>
+            <a:r>
+              <a:rPr lang="en-US" sz="2800" dirty="0"/>
+              <a:t>bar1 = </a:t>
+            </a:r>
+            <a:r>
+              <a:rPr lang="en-US" sz="2800" dirty="0" err="1"/>
+              <a:t>ggplot</a:t>
+            </a:r>
+            <a:r>
+              <a:rPr lang="en-US" sz="2800" dirty="0"/>
+              <a:t>(data=</a:t>
+            </a:r>
+            <a:r>
+              <a:rPr lang="en-US" sz="2800" dirty="0" err="1"/>
+              <a:t>iris_melted</a:t>
+            </a:r>
+            <a:r>
+              <a:rPr lang="en-US" sz="2800" dirty="0"/>
+              <a:t>, </a:t>
+            </a:r>
+            <a:r>
+              <a:rPr lang="en-US" sz="2800" dirty="0" err="1"/>
+              <a:t>aes</a:t>
+            </a:r>
+            <a:r>
+              <a:rPr lang="en-US" sz="2800" dirty="0"/>
+              <a:t>(x=Species, y=value, fill=variable))</a:t>
+            </a:r>
+          </a:p>
+          <a:p>
+            <a:r>
+              <a:rPr lang="en-US" sz="2800" dirty="0"/>
+              <a:t>bar1 + </a:t>
+            </a:r>
+            <a:r>
+              <a:rPr lang="en-US" sz="2800" dirty="0" err="1"/>
+              <a:t>geom_bar</a:t>
+            </a:r>
+            <a:r>
+              <a:rPr lang="en-US" sz="2800" dirty="0"/>
+              <a:t>(stat="identity", position="dodge") </a:t>
+            </a:r>
+          </a:p>
+        </p:txBody>
+      </p:sp>
+    </p:spTree>
+    <p:extLst>
+      <p:ext uri="{BB962C8B-B14F-4D97-AF65-F5344CB8AC3E}">
+        <p14:creationId xmlns:p14="http://schemas.microsoft.com/office/powerpoint/2010/main" val="558901683"/>
+      </p:ext>
+    </p:extLst>
+  </p:cSld>
+  <p:clrMapOvr>
+    <a:masterClrMapping/>
+  </p:clrMapOvr>
+</p:sld>
+</file>
+
+<file path=ppt/slides/slide9.xml><?xml version="1.0" encoding="utf-8"?>
+<p:sld xmlns:a="http://schemas.openxmlformats.org/drawingml/2006/main" xmlns:r="http://schemas.openxmlformats.org/officeDocument/2006/relationships" xmlns:p="http://schemas.openxmlformats.org/presentationml/2006/main">
+  <p:cSld>
+    <p:spTree>
+      <p:nvGrpSpPr>
+        <p:cNvPr id="1" name=""/>
+        <p:cNvGrpSpPr/>
+        <p:nvPr/>
+      </p:nvGrpSpPr>
+      <p:grpSpPr>
+        <a:xfrm>
+          <a:off x="0" y="0"/>
+          <a:ext cx="0" cy="0"/>
+          <a:chOff x="0" y="0"/>
+          <a:chExt cx="0" cy="0"/>
+        </a:xfrm>
+      </p:grpSpPr>
+      <p:sp>
+        <p:nvSpPr>
+          <p:cNvPr id="4" name="Title 3">
+            <a:extLst>
+              <a:ext uri="{FF2B5EF4-FFF2-40B4-BE49-F238E27FC236}">
+                <a16:creationId xmlns:a16="http://schemas.microsoft.com/office/drawing/2014/main" id="{F2ACF975-7A3C-64A8-E0FA-FB9F354B6CBE}"/>
+              </a:ext>
+            </a:extLst>
+          </p:cNvPr>
+          <p:cNvSpPr>
+            <a:spLocks noGrp="1"/>
+          </p:cNvSpPr>
+          <p:nvPr>
+            <p:ph type="title"/>
+          </p:nvPr>
+        </p:nvSpPr>
+        <p:spPr/>
+        <p:txBody>
+          <a:bodyPr/>
+          <a:lstStyle/>
+          <a:p>
+            <a:r>
+              <a:rPr lang="en-US" dirty="0"/>
+              <a:t>Bar Plot of all Features with Custom Colors</a:t>
+            </a:r>
+          </a:p>
+        </p:txBody>
+      </p:sp>
+      <p:sp>
+        <p:nvSpPr>
+          <p:cNvPr id="6" name="Text Placeholder 5">
+            <a:extLst>
+              <a:ext uri="{FF2B5EF4-FFF2-40B4-BE49-F238E27FC236}">
+                <a16:creationId xmlns:a16="http://schemas.microsoft.com/office/drawing/2014/main" id="{DC692EF3-137D-6383-99DA-B1E6C863B09F}"/>
+              </a:ext>
+            </a:extLst>
+          </p:cNvPr>
+          <p:cNvSpPr>
+            <a:spLocks noGrp="1"/>
+          </p:cNvSpPr>
+          <p:nvPr>
+            <p:ph type="body" sz="half" idx="2"/>
+          </p:nvPr>
+        </p:nvSpPr>
+        <p:spPr/>
+        <p:txBody>
+          <a:bodyPr>
+            <a:normAutofit fontScale="92500" lnSpcReduction="10000"/>
+          </a:bodyPr>
+          <a:lstStyle/>
+          <a:p>
+            <a:r>
+              <a:rPr lang="en-US" sz="2800" dirty="0"/>
+              <a:t>bar1 = </a:t>
+            </a:r>
+            <a:r>
+              <a:rPr lang="en-US" sz="2800" dirty="0" err="1"/>
+              <a:t>ggplot</a:t>
+            </a:r>
+            <a:r>
+              <a:rPr lang="en-US" sz="2800" dirty="0"/>
+              <a:t>(data=</a:t>
+            </a:r>
+            <a:r>
+              <a:rPr lang="en-US" sz="2800" dirty="0" err="1"/>
+              <a:t>iris_melted</a:t>
+            </a:r>
+            <a:r>
+              <a:rPr lang="en-US" sz="2800" dirty="0"/>
+              <a:t>, </a:t>
+            </a:r>
+            <a:r>
+              <a:rPr lang="en-US" sz="2800" dirty="0" err="1"/>
+              <a:t>aes</a:t>
+            </a:r>
+            <a:r>
+              <a:rPr lang="en-US" sz="2800" dirty="0"/>
+              <a:t>(x=Species, y=value, fill=variable))</a:t>
+            </a:r>
+          </a:p>
+          <a:p>
+            <a:r>
+              <a:rPr lang="en-US" sz="2800" dirty="0"/>
+              <a:t>bar1 + </a:t>
+            </a:r>
+            <a:r>
+              <a:rPr lang="en-US" sz="2800" dirty="0" err="1"/>
+              <a:t>geom_bar</a:t>
+            </a:r>
+            <a:r>
+              <a:rPr lang="en-US" sz="2800" dirty="0"/>
+              <a:t>(stat="identity", position="dodge") +</a:t>
+            </a:r>
+          </a:p>
+          <a:p>
+            <a:r>
+              <a:rPr lang="en-US" sz="2800" dirty="0"/>
+              <a:t>  </a:t>
+            </a:r>
+            <a:r>
+              <a:rPr lang="en-US" sz="2800" dirty="0" err="1"/>
+              <a:t>scale_fill_manual</a:t>
+            </a:r>
+            <a:r>
+              <a:rPr lang="en-US" sz="2800" dirty="0"/>
+              <a:t>(values = c("</a:t>
+            </a:r>
+            <a:r>
+              <a:rPr lang="en-US" sz="2800" dirty="0" err="1"/>
+              <a:t>steelblue</a:t>
+            </a:r>
+            <a:r>
+              <a:rPr lang="en-US" sz="2800" dirty="0"/>
+              <a:t>", "</a:t>
+            </a:r>
+            <a:r>
+              <a:rPr lang="en-US" sz="2800" dirty="0" err="1"/>
+              <a:t>limegreen</a:t>
+            </a:r>
+            <a:r>
+              <a:rPr lang="en-US" sz="2800" dirty="0"/>
+              <a:t>", "purple", "thistle"))</a:t>
+            </a:r>
+          </a:p>
+        </p:txBody>
+      </p:sp>
+      <p:pic>
+        <p:nvPicPr>
+          <p:cNvPr id="7" name="Content Placeholder 6" descr="Chart, bar chart&#10;&#10;Description automatically generated">
+            <a:extLst>
+              <a:ext uri="{FF2B5EF4-FFF2-40B4-BE49-F238E27FC236}">
+                <a16:creationId xmlns:a16="http://schemas.microsoft.com/office/drawing/2014/main" id="{B593E29C-8F6D-3D15-7234-E43E3B9904CD}"/>
+              </a:ext>
+            </a:extLst>
+          </p:cNvPr>
+          <p:cNvPicPr>
+            <a:picLocks noGrp="1" noChangeAspect="1"/>
+          </p:cNvPicPr>
+          <p:nvPr>
+            <p:ph idx="1"/>
+          </p:nvPr>
+        </p:nvPicPr>
+        <p:blipFill>
+          <a:blip r:embed="rId2"/>
+          <a:stretch>
+            <a:fillRect/>
+          </a:stretch>
+        </p:blipFill>
+        <p:spPr>
+          <a:xfrm>
+            <a:off x="5183188" y="1519673"/>
+            <a:ext cx="6172200" cy="3809129"/>
+          </a:xfrm>
+        </p:spPr>
+      </p:pic>
+    </p:spTree>
+    <p:extLst>
+      <p:ext uri="{BB962C8B-B14F-4D97-AF65-F5344CB8AC3E}">
+        <p14:creationId xmlns:p14="http://schemas.microsoft.com/office/powerpoint/2010/main" val="1768402670"/>
       </p:ext>
     </p:extLst>
   </p:cSld>

</xml_diff>